<commit_message>
update architecture and documention
</commit_message>
<xml_diff>
--- a/documents/architectures.pptx
+++ b/documents/architectures.pptx
@@ -7,6 +7,7 @@
   <p:sldIdLst>
     <p:sldId id="256" r:id="rId2"/>
     <p:sldId id="257" r:id="rId3"/>
+    <p:sldId id="258" r:id="rId4"/>
   </p:sldIdLst>
   <p:sldSz cx="12192000" cy="6858000"/>
   <p:notesSz cx="6858000" cy="9144000"/>
@@ -105,6 +106,11 @@
       </a:defRPr>
     </a:lvl9pPr>
   </p:defaultTextStyle>
+  <p:extLst>
+    <p:ext uri="{EFAFB233-063F-42B5-8137-9DF3F51BA10A}">
+      <p15:sldGuideLst xmlns:p15="http://schemas.microsoft.com/office/powerpoint/2012/main"/>
+    </p:ext>
+  </p:extLst>
 </p:presentation>
 </file>
 
@@ -595,7 +601,7 @@
           <a:p>
             <a:fld id="{ADD04F22-8DFA-40EE-83C0-2BE3C12BD5D4}" type="datetimeFigureOut">
               <a:rPr lang="en-US" smtClean="0"/>
-              <a:t>2/24/2023</a:t>
+              <a:t>3/2/2023</a:t>
             </a:fld>
             <a:endParaRPr lang="en-US"/>
           </a:p>
@@ -793,7 +799,7 @@
           <a:p>
             <a:fld id="{ADD04F22-8DFA-40EE-83C0-2BE3C12BD5D4}" type="datetimeFigureOut">
               <a:rPr lang="en-US" smtClean="0"/>
-              <a:t>2/24/2023</a:t>
+              <a:t>3/2/2023</a:t>
             </a:fld>
             <a:endParaRPr lang="en-US"/>
           </a:p>
@@ -1001,7 +1007,7 @@
           <a:p>
             <a:fld id="{ADD04F22-8DFA-40EE-83C0-2BE3C12BD5D4}" type="datetimeFigureOut">
               <a:rPr lang="en-US" smtClean="0"/>
-              <a:t>2/24/2023</a:t>
+              <a:t>3/2/2023</a:t>
             </a:fld>
             <a:endParaRPr lang="en-US"/>
           </a:p>
@@ -1199,7 +1205,7 @@
           <a:p>
             <a:fld id="{ADD04F22-8DFA-40EE-83C0-2BE3C12BD5D4}" type="datetimeFigureOut">
               <a:rPr lang="en-US" smtClean="0"/>
-              <a:t>2/24/2023</a:t>
+              <a:t>3/2/2023</a:t>
             </a:fld>
             <a:endParaRPr lang="en-US"/>
           </a:p>
@@ -1474,7 +1480,7 @@
           <a:p>
             <a:fld id="{ADD04F22-8DFA-40EE-83C0-2BE3C12BD5D4}" type="datetimeFigureOut">
               <a:rPr lang="en-US" smtClean="0"/>
-              <a:t>2/24/2023</a:t>
+              <a:t>3/2/2023</a:t>
             </a:fld>
             <a:endParaRPr lang="en-US"/>
           </a:p>
@@ -1739,7 +1745,7 @@
           <a:p>
             <a:fld id="{ADD04F22-8DFA-40EE-83C0-2BE3C12BD5D4}" type="datetimeFigureOut">
               <a:rPr lang="en-US" smtClean="0"/>
-              <a:t>2/24/2023</a:t>
+              <a:t>3/2/2023</a:t>
             </a:fld>
             <a:endParaRPr lang="en-US"/>
           </a:p>
@@ -2151,7 +2157,7 @@
           <a:p>
             <a:fld id="{ADD04F22-8DFA-40EE-83C0-2BE3C12BD5D4}" type="datetimeFigureOut">
               <a:rPr lang="en-US" smtClean="0"/>
-              <a:t>2/24/2023</a:t>
+              <a:t>3/2/2023</a:t>
             </a:fld>
             <a:endParaRPr lang="en-US"/>
           </a:p>
@@ -2292,7 +2298,7 @@
           <a:p>
             <a:fld id="{ADD04F22-8DFA-40EE-83C0-2BE3C12BD5D4}" type="datetimeFigureOut">
               <a:rPr lang="en-US" smtClean="0"/>
-              <a:t>2/24/2023</a:t>
+              <a:t>3/2/2023</a:t>
             </a:fld>
             <a:endParaRPr lang="en-US"/>
           </a:p>
@@ -2405,7 +2411,7 @@
           <a:p>
             <a:fld id="{ADD04F22-8DFA-40EE-83C0-2BE3C12BD5D4}" type="datetimeFigureOut">
               <a:rPr lang="en-US" smtClean="0"/>
-              <a:t>2/24/2023</a:t>
+              <a:t>3/2/2023</a:t>
             </a:fld>
             <a:endParaRPr lang="en-US"/>
           </a:p>
@@ -2716,7 +2722,7 @@
           <a:p>
             <a:fld id="{ADD04F22-8DFA-40EE-83C0-2BE3C12BD5D4}" type="datetimeFigureOut">
               <a:rPr lang="en-US" smtClean="0"/>
-              <a:t>2/24/2023</a:t>
+              <a:t>3/2/2023</a:t>
             </a:fld>
             <a:endParaRPr lang="en-US"/>
           </a:p>
@@ -3004,7 +3010,7 @@
           <a:p>
             <a:fld id="{ADD04F22-8DFA-40EE-83C0-2BE3C12BD5D4}" type="datetimeFigureOut">
               <a:rPr lang="en-US" smtClean="0"/>
-              <a:t>2/24/2023</a:t>
+              <a:t>3/2/2023</a:t>
             </a:fld>
             <a:endParaRPr lang="en-US"/>
           </a:p>
@@ -3245,7 +3251,7 @@
           <a:p>
             <a:fld id="{ADD04F22-8DFA-40EE-83C0-2BE3C12BD5D4}" type="datetimeFigureOut">
               <a:rPr lang="en-US" smtClean="0"/>
-              <a:t>2/24/2023</a:t>
+              <a:t>3/2/2023</a:t>
             </a:fld>
             <a:endParaRPr lang="en-US"/>
           </a:p>
@@ -5386,6 +5392,1528 @@
 </p:sld>
 </file>
 
+<file path=ppt/slides/slide3.xml><?xml version="1.0" encoding="utf-8"?>
+<p:sld xmlns:a="http://schemas.openxmlformats.org/drawingml/2006/main" xmlns:r="http://schemas.openxmlformats.org/officeDocument/2006/relationships" xmlns:p="http://schemas.openxmlformats.org/presentationml/2006/main">
+  <p:cSld>
+    <p:spTree>
+      <p:nvGrpSpPr>
+        <p:cNvPr id="1" name=""/>
+        <p:cNvGrpSpPr/>
+        <p:nvPr/>
+      </p:nvGrpSpPr>
+      <p:grpSpPr>
+        <a:xfrm>
+          <a:off x="0" y="0"/>
+          <a:ext cx="0" cy="0"/>
+          <a:chOff x="0" y="0"/>
+          <a:chExt cx="0" cy="0"/>
+        </a:xfrm>
+      </p:grpSpPr>
+      <p:sp>
+        <p:nvSpPr>
+          <p:cNvPr id="2" name="Title 1">
+            <a:extLst>
+              <a:ext uri="{FF2B5EF4-FFF2-40B4-BE49-F238E27FC236}">
+                <a16:creationId xmlns:a16="http://schemas.microsoft.com/office/drawing/2014/main" id="{4CD8998F-1E55-586F-0A97-539C9E88FC09}"/>
+              </a:ext>
+            </a:extLst>
+          </p:cNvPr>
+          <p:cNvSpPr>
+            <a:spLocks noGrp="1"/>
+          </p:cNvSpPr>
+          <p:nvPr>
+            <p:ph type="title"/>
+          </p:nvPr>
+        </p:nvSpPr>
+        <p:spPr/>
+        <p:txBody>
+          <a:bodyPr/>
+          <a:lstStyle/>
+          <a:p>
+            <a:r>
+              <a:rPr lang="en-US" dirty="0"/>
+              <a:t>Open AI on custom dataset</a:t>
+            </a:r>
+          </a:p>
+        </p:txBody>
+      </p:sp>
+      <p:pic>
+        <p:nvPicPr>
+          <p:cNvPr id="5" name="グラフィックス 10">
+            <a:extLst>
+              <a:ext uri="{FF2B5EF4-FFF2-40B4-BE49-F238E27FC236}">
+                <a16:creationId xmlns:a16="http://schemas.microsoft.com/office/drawing/2014/main" id="{1E4AF80D-82A6-00AA-5A93-B9602EA567B6}"/>
+              </a:ext>
+            </a:extLst>
+          </p:cNvPr>
+          <p:cNvPicPr>
+            <a:picLocks noChangeAspect="1"/>
+          </p:cNvPicPr>
+          <p:nvPr/>
+        </p:nvPicPr>
+        <p:blipFill>
+          <a:blip r:embed="rId2">
+            <a:extLst>
+              <a:ext uri="{28A0092B-C50C-407E-A947-70E740481C1C}">
+                <a14:useLocalDpi xmlns:a14="http://schemas.microsoft.com/office/drawing/2010/main" val="0"/>
+              </a:ext>
+              <a:ext uri="{96DAC541-7B7A-43D3-8B79-37D633B846F1}">
+                <asvg:svgBlip xmlns:asvg="http://schemas.microsoft.com/office/drawing/2016/SVG/main" r:embed="rId3"/>
+              </a:ext>
+            </a:extLst>
+          </a:blip>
+          <a:stretch>
+            <a:fillRect/>
+          </a:stretch>
+        </p:blipFill>
+        <p:spPr>
+          <a:xfrm>
+            <a:off x="4307266" y="2816454"/>
+            <a:ext cx="803048" cy="803048"/>
+          </a:xfrm>
+          <a:prstGeom prst="rect">
+            <a:avLst/>
+          </a:prstGeom>
+        </p:spPr>
+      </p:pic>
+      <p:sp>
+        <p:nvSpPr>
+          <p:cNvPr id="8" name="Rectangle 7">
+            <a:extLst>
+              <a:ext uri="{FF2B5EF4-FFF2-40B4-BE49-F238E27FC236}">
+                <a16:creationId xmlns:a16="http://schemas.microsoft.com/office/drawing/2014/main" id="{F1EA7696-F816-A1CC-25E6-6AC2BC68B00D}"/>
+              </a:ext>
+            </a:extLst>
+          </p:cNvPr>
+          <p:cNvSpPr/>
+          <p:nvPr/>
+        </p:nvSpPr>
+        <p:spPr>
+          <a:xfrm>
+            <a:off x="1152941" y="3475158"/>
+            <a:ext cx="1316727" cy="425758"/>
+          </a:xfrm>
+          <a:prstGeom prst="rect">
+            <a:avLst/>
+          </a:prstGeom>
+          <a:ln>
+            <a:noFill/>
+          </a:ln>
+        </p:spPr>
+        <p:txBody>
+          <a:bodyPr wrap="square">
+            <a:spAutoFit/>
+          </a:bodyPr>
+          <a:lstStyle/>
+          <a:p>
+            <a:pPr marL="0" marR="0" lvl="0" indent="0" algn="ctr" defTabSz="685800" eaLnBrk="1" fontAlgn="auto" latinLnBrk="0" hangingPunct="1">
+              <a:lnSpc>
+                <a:spcPct val="100000"/>
+              </a:lnSpc>
+              <a:spcBef>
+                <a:spcPts val="0"/>
+              </a:spcBef>
+              <a:spcAft>
+                <a:spcPts val="225"/>
+              </a:spcAft>
+              <a:buClrTx/>
+              <a:buSzPct val="90000"/>
+              <a:buFont typeface="Arial"/>
+              <a:buNone/>
+              <a:tabLst/>
+              <a:defRPr/>
+            </a:pPr>
+            <a:r>
+              <a:rPr kumimoji="0" lang="en-US" sz="1000" b="1" i="0" u="none" strike="noStrike" kern="0" cap="none" spc="0" normalizeH="0" baseline="0" noProof="0" dirty="0">
+                <a:ln>
+                  <a:noFill/>
+                </a:ln>
+                <a:effectLst/>
+                <a:uLnTx/>
+                <a:uFillTx/>
+                <a:latin typeface="Segoe UI Semibold"/>
+                <a:ea typeface="MS PGothic" panose="020B0600070205080204" pitchFamily="34" charset="-128"/>
+                <a:cs typeface="Segoe UI Semibold" panose="020B0702040204020203" pitchFamily="34" charset="0"/>
+                <a:sym typeface="Arial"/>
+              </a:rPr>
+              <a:t>Input Data</a:t>
+            </a:r>
+          </a:p>
+          <a:p>
+            <a:pPr marL="0" marR="0" lvl="0" indent="0" algn="ctr" defTabSz="685800" eaLnBrk="1" fontAlgn="auto" latinLnBrk="0" hangingPunct="1">
+              <a:lnSpc>
+                <a:spcPct val="100000"/>
+              </a:lnSpc>
+              <a:spcBef>
+                <a:spcPts val="0"/>
+              </a:spcBef>
+              <a:spcAft>
+                <a:spcPts val="225"/>
+              </a:spcAft>
+              <a:buClrTx/>
+              <a:buSzPct val="90000"/>
+              <a:buFont typeface="Arial"/>
+              <a:buNone/>
+              <a:tabLst/>
+              <a:defRPr/>
+            </a:pPr>
+            <a:endParaRPr kumimoji="0" lang="en-US" sz="1000" b="0" i="0" u="none" strike="noStrike" kern="0" cap="none" spc="0" normalizeH="0" baseline="0" noProof="0" dirty="0">
+              <a:ln>
+                <a:noFill/>
+              </a:ln>
+              <a:effectLst/>
+              <a:uLnTx/>
+              <a:uFillTx/>
+              <a:latin typeface="Segoe UI Semibold"/>
+              <a:ea typeface="MS PGothic" panose="020B0600070205080204" pitchFamily="34" charset="-128"/>
+              <a:cs typeface="Segoe UI Semibold" panose="020B0702040204020203" pitchFamily="34" charset="0"/>
+              <a:sym typeface="Arial"/>
+            </a:endParaRPr>
+          </a:p>
+        </p:txBody>
+      </p:sp>
+      <p:sp>
+        <p:nvSpPr>
+          <p:cNvPr id="9" name="Freeform 5">
+            <a:extLst>
+              <a:ext uri="{FF2B5EF4-FFF2-40B4-BE49-F238E27FC236}">
+                <a16:creationId xmlns:a16="http://schemas.microsoft.com/office/drawing/2014/main" id="{0215DBEB-4871-0092-5C89-B45A0F05270F}"/>
+              </a:ext>
+            </a:extLst>
+          </p:cNvPr>
+          <p:cNvSpPr>
+            <a:spLocks noEditPoints="1"/>
+          </p:cNvSpPr>
+          <p:nvPr/>
+        </p:nvSpPr>
+        <p:spPr bwMode="auto">
+          <a:xfrm>
+            <a:off x="1359276" y="2868224"/>
+            <a:ext cx="915567" cy="560776"/>
+          </a:xfrm>
+          <a:custGeom>
+            <a:avLst/>
+            <a:gdLst>
+              <a:gd name="T0" fmla="*/ 3752 w 5983"/>
+              <a:gd name="T1" fmla="*/ 2549 h 4697"/>
+              <a:gd name="T2" fmla="*/ 2693 w 5983"/>
+              <a:gd name="T3" fmla="*/ 4063 h 4697"/>
+              <a:gd name="T4" fmla="*/ 2651 w 5983"/>
+              <a:gd name="T5" fmla="*/ 4087 h 4697"/>
+              <a:gd name="T6" fmla="*/ 2627 w 5983"/>
+              <a:gd name="T7" fmla="*/ 4081 h 4697"/>
+              <a:gd name="T8" fmla="*/ 2603 w 5983"/>
+              <a:gd name="T9" fmla="*/ 4021 h 4697"/>
+              <a:gd name="T10" fmla="*/ 2878 w 5983"/>
+              <a:gd name="T11" fmla="*/ 3117 h 4697"/>
+              <a:gd name="T12" fmla="*/ 2262 w 5983"/>
+              <a:gd name="T13" fmla="*/ 3117 h 4697"/>
+              <a:gd name="T14" fmla="*/ 2214 w 5983"/>
+              <a:gd name="T15" fmla="*/ 3087 h 4697"/>
+              <a:gd name="T16" fmla="*/ 2220 w 5983"/>
+              <a:gd name="T17" fmla="*/ 3034 h 4697"/>
+              <a:gd name="T18" fmla="*/ 3249 w 5983"/>
+              <a:gd name="T19" fmla="*/ 1538 h 4697"/>
+              <a:gd name="T20" fmla="*/ 3291 w 5983"/>
+              <a:gd name="T21" fmla="*/ 1514 h 4697"/>
+              <a:gd name="T22" fmla="*/ 3315 w 5983"/>
+              <a:gd name="T23" fmla="*/ 1520 h 4697"/>
+              <a:gd name="T24" fmla="*/ 3339 w 5983"/>
+              <a:gd name="T25" fmla="*/ 1580 h 4697"/>
+              <a:gd name="T26" fmla="*/ 3075 w 5983"/>
+              <a:gd name="T27" fmla="*/ 2465 h 4697"/>
+              <a:gd name="T28" fmla="*/ 3710 w 5983"/>
+              <a:gd name="T29" fmla="*/ 2465 h 4697"/>
+              <a:gd name="T30" fmla="*/ 3763 w 5983"/>
+              <a:gd name="T31" fmla="*/ 2519 h 4697"/>
+              <a:gd name="T32" fmla="*/ 3752 w 5983"/>
+              <a:gd name="T33" fmla="*/ 2549 h 4697"/>
+              <a:gd name="T34" fmla="*/ 5750 w 5983"/>
+              <a:gd name="T35" fmla="*/ 754 h 4697"/>
+              <a:gd name="T36" fmla="*/ 0 w 5983"/>
+              <a:gd name="T37" fmla="*/ 754 h 4697"/>
+              <a:gd name="T38" fmla="*/ 0 w 5983"/>
+              <a:gd name="T39" fmla="*/ 4326 h 4697"/>
+              <a:gd name="T40" fmla="*/ 371 w 5983"/>
+              <a:gd name="T41" fmla="*/ 4697 h 4697"/>
+              <a:gd name="T42" fmla="*/ 5612 w 5983"/>
+              <a:gd name="T43" fmla="*/ 4697 h 4697"/>
+              <a:gd name="T44" fmla="*/ 5983 w 5983"/>
+              <a:gd name="T45" fmla="*/ 4326 h 4697"/>
+              <a:gd name="T46" fmla="*/ 5983 w 5983"/>
+              <a:gd name="T47" fmla="*/ 1095 h 4697"/>
+              <a:gd name="T48" fmla="*/ 5750 w 5983"/>
+              <a:gd name="T49" fmla="*/ 754 h 4697"/>
+              <a:gd name="T50" fmla="*/ 3536 w 5983"/>
+              <a:gd name="T51" fmla="*/ 485 h 4697"/>
+              <a:gd name="T52" fmla="*/ 3363 w 5983"/>
+              <a:gd name="T53" fmla="*/ 186 h 4697"/>
+              <a:gd name="T54" fmla="*/ 3040 w 5983"/>
+              <a:gd name="T55" fmla="*/ 0 h 4697"/>
+              <a:gd name="T56" fmla="*/ 371 w 5983"/>
+              <a:gd name="T57" fmla="*/ 0 h 4697"/>
+              <a:gd name="T58" fmla="*/ 0 w 5983"/>
+              <a:gd name="T59" fmla="*/ 371 h 4697"/>
+              <a:gd name="T60" fmla="*/ 0 w 5983"/>
+              <a:gd name="T61" fmla="*/ 563 h 4697"/>
+              <a:gd name="T62" fmla="*/ 3602 w 5983"/>
+              <a:gd name="T63" fmla="*/ 563 h 4697"/>
+              <a:gd name="T64" fmla="*/ 3536 w 5983"/>
+              <a:gd name="T65" fmla="*/ 485 h 4697"/>
+            </a:gdLst>
+            <a:ahLst/>
+            <a:cxnLst>
+              <a:cxn ang="0">
+                <a:pos x="T0" y="T1"/>
+              </a:cxn>
+              <a:cxn ang="0">
+                <a:pos x="T2" y="T3"/>
+              </a:cxn>
+              <a:cxn ang="0">
+                <a:pos x="T4" y="T5"/>
+              </a:cxn>
+              <a:cxn ang="0">
+                <a:pos x="T6" y="T7"/>
+              </a:cxn>
+              <a:cxn ang="0">
+                <a:pos x="T8" y="T9"/>
+              </a:cxn>
+              <a:cxn ang="0">
+                <a:pos x="T10" y="T11"/>
+              </a:cxn>
+              <a:cxn ang="0">
+                <a:pos x="T12" y="T13"/>
+              </a:cxn>
+              <a:cxn ang="0">
+                <a:pos x="T14" y="T15"/>
+              </a:cxn>
+              <a:cxn ang="0">
+                <a:pos x="T16" y="T17"/>
+              </a:cxn>
+              <a:cxn ang="0">
+                <a:pos x="T18" y="T19"/>
+              </a:cxn>
+              <a:cxn ang="0">
+                <a:pos x="T20" y="T21"/>
+              </a:cxn>
+              <a:cxn ang="0">
+                <a:pos x="T22" y="T23"/>
+              </a:cxn>
+              <a:cxn ang="0">
+                <a:pos x="T24" y="T25"/>
+              </a:cxn>
+              <a:cxn ang="0">
+                <a:pos x="T26" y="T27"/>
+              </a:cxn>
+              <a:cxn ang="0">
+                <a:pos x="T28" y="T29"/>
+              </a:cxn>
+              <a:cxn ang="0">
+                <a:pos x="T30" y="T31"/>
+              </a:cxn>
+              <a:cxn ang="0">
+                <a:pos x="T32" y="T33"/>
+              </a:cxn>
+              <a:cxn ang="0">
+                <a:pos x="T34" y="T35"/>
+              </a:cxn>
+              <a:cxn ang="0">
+                <a:pos x="T36" y="T37"/>
+              </a:cxn>
+              <a:cxn ang="0">
+                <a:pos x="T38" y="T39"/>
+              </a:cxn>
+              <a:cxn ang="0">
+                <a:pos x="T40" y="T41"/>
+              </a:cxn>
+              <a:cxn ang="0">
+                <a:pos x="T42" y="T43"/>
+              </a:cxn>
+              <a:cxn ang="0">
+                <a:pos x="T44" y="T45"/>
+              </a:cxn>
+              <a:cxn ang="0">
+                <a:pos x="T46" y="T47"/>
+              </a:cxn>
+              <a:cxn ang="0">
+                <a:pos x="T48" y="T49"/>
+              </a:cxn>
+              <a:cxn ang="0">
+                <a:pos x="T50" y="T51"/>
+              </a:cxn>
+              <a:cxn ang="0">
+                <a:pos x="T52" y="T53"/>
+              </a:cxn>
+              <a:cxn ang="0">
+                <a:pos x="T54" y="T55"/>
+              </a:cxn>
+              <a:cxn ang="0">
+                <a:pos x="T56" y="T57"/>
+              </a:cxn>
+              <a:cxn ang="0">
+                <a:pos x="T58" y="T59"/>
+              </a:cxn>
+              <a:cxn ang="0">
+                <a:pos x="T60" y="T61"/>
+              </a:cxn>
+              <a:cxn ang="0">
+                <a:pos x="T62" y="T63"/>
+              </a:cxn>
+              <a:cxn ang="0">
+                <a:pos x="T64" y="T65"/>
+              </a:cxn>
+            </a:cxnLst>
+            <a:rect l="0" t="0" r="r" b="b"/>
+            <a:pathLst>
+              <a:path w="5983" h="4697">
+                <a:moveTo>
+                  <a:pt x="3752" y="2549"/>
+                </a:moveTo>
+                <a:lnTo>
+                  <a:pt x="2693" y="4063"/>
+                </a:lnTo>
+                <a:cubicBezTo>
+                  <a:pt x="2681" y="4075"/>
+                  <a:pt x="2669" y="4087"/>
+                  <a:pt x="2651" y="4087"/>
+                </a:cubicBezTo>
+                <a:cubicBezTo>
+                  <a:pt x="2645" y="4087"/>
+                  <a:pt x="2633" y="4087"/>
+                  <a:pt x="2627" y="4081"/>
+                </a:cubicBezTo>
+                <a:cubicBezTo>
+                  <a:pt x="2603" y="4069"/>
+                  <a:pt x="2591" y="4045"/>
+                  <a:pt x="2603" y="4021"/>
+                </a:cubicBezTo>
+                <a:lnTo>
+                  <a:pt x="2878" y="3117"/>
+                </a:lnTo>
+                <a:lnTo>
+                  <a:pt x="2262" y="3117"/>
+                </a:lnTo>
+                <a:cubicBezTo>
+                  <a:pt x="2244" y="3117"/>
+                  <a:pt x="2226" y="3105"/>
+                  <a:pt x="2214" y="3087"/>
+                </a:cubicBezTo>
+                <a:cubicBezTo>
+                  <a:pt x="2208" y="3070"/>
+                  <a:pt x="2208" y="3052"/>
+                  <a:pt x="2220" y="3034"/>
+                </a:cubicBezTo>
+                <a:lnTo>
+                  <a:pt x="3249" y="1538"/>
+                </a:lnTo>
+                <a:cubicBezTo>
+                  <a:pt x="3261" y="1526"/>
+                  <a:pt x="3273" y="1514"/>
+                  <a:pt x="3291" y="1514"/>
+                </a:cubicBezTo>
+                <a:cubicBezTo>
+                  <a:pt x="3297" y="1514"/>
+                  <a:pt x="3303" y="1514"/>
+                  <a:pt x="3315" y="1520"/>
+                </a:cubicBezTo>
+                <a:cubicBezTo>
+                  <a:pt x="3339" y="1532"/>
+                  <a:pt x="3351" y="1556"/>
+                  <a:pt x="3339" y="1580"/>
+                </a:cubicBezTo>
+                <a:lnTo>
+                  <a:pt x="3075" y="2465"/>
+                </a:lnTo>
+                <a:lnTo>
+                  <a:pt x="3710" y="2465"/>
+                </a:lnTo>
+                <a:cubicBezTo>
+                  <a:pt x="3740" y="2465"/>
+                  <a:pt x="3763" y="2489"/>
+                  <a:pt x="3763" y="2519"/>
+                </a:cubicBezTo>
+                <a:cubicBezTo>
+                  <a:pt x="3763" y="2531"/>
+                  <a:pt x="3758" y="2537"/>
+                  <a:pt x="3752" y="2549"/>
+                </a:cubicBezTo>
+                <a:close/>
+                <a:moveTo>
+                  <a:pt x="5750" y="754"/>
+                </a:moveTo>
+                <a:lnTo>
+                  <a:pt x="0" y="754"/>
+                </a:lnTo>
+                <a:lnTo>
+                  <a:pt x="0" y="4326"/>
+                </a:lnTo>
+                <a:cubicBezTo>
+                  <a:pt x="0" y="4529"/>
+                  <a:pt x="168" y="4697"/>
+                  <a:pt x="371" y="4697"/>
+                </a:cubicBezTo>
+                <a:lnTo>
+                  <a:pt x="5612" y="4697"/>
+                </a:lnTo>
+                <a:cubicBezTo>
+                  <a:pt x="5816" y="4697"/>
+                  <a:pt x="5983" y="4529"/>
+                  <a:pt x="5983" y="4326"/>
+                </a:cubicBezTo>
+                <a:lnTo>
+                  <a:pt x="5983" y="1095"/>
+                </a:lnTo>
+                <a:cubicBezTo>
+                  <a:pt x="5983" y="946"/>
+                  <a:pt x="5887" y="814"/>
+                  <a:pt x="5750" y="754"/>
+                </a:cubicBezTo>
+                <a:close/>
+                <a:moveTo>
+                  <a:pt x="3536" y="485"/>
+                </a:moveTo>
+                <a:lnTo>
+                  <a:pt x="3363" y="186"/>
+                </a:lnTo>
+                <a:cubicBezTo>
+                  <a:pt x="3297" y="72"/>
+                  <a:pt x="3171" y="0"/>
+                  <a:pt x="3040" y="0"/>
+                </a:cubicBezTo>
+                <a:lnTo>
+                  <a:pt x="371" y="0"/>
+                </a:lnTo>
+                <a:cubicBezTo>
+                  <a:pt x="168" y="0"/>
+                  <a:pt x="0" y="168"/>
+                  <a:pt x="0" y="371"/>
+                </a:cubicBezTo>
+                <a:lnTo>
+                  <a:pt x="0" y="563"/>
+                </a:lnTo>
+                <a:lnTo>
+                  <a:pt x="3602" y="563"/>
+                </a:lnTo>
+                <a:cubicBezTo>
+                  <a:pt x="3572" y="545"/>
+                  <a:pt x="3554" y="515"/>
+                  <a:pt x="3536" y="485"/>
+                </a:cubicBezTo>
+                <a:close/>
+              </a:path>
+            </a:pathLst>
+          </a:custGeom>
+          <a:solidFill>
+            <a:srgbClr val="0078D3"/>
+          </a:solidFill>
+          <a:ln w="0">
+            <a:solidFill>
+              <a:srgbClr val="0078D3"/>
+            </a:solidFill>
+            <a:prstDash val="solid"/>
+            <a:round/>
+            <a:headEnd/>
+            <a:tailEnd/>
+          </a:ln>
+        </p:spPr>
+        <p:txBody>
+          <a:bodyPr vert="horz" wrap="square" lIns="56027" tIns="28013" rIns="56027" bIns="28013" numCol="1" anchor="t" anchorCtr="0" compatLnSpc="1">
+            <a:prstTxWarp prst="textNoShape">
+              <a:avLst/>
+            </a:prstTxWarp>
+          </a:bodyPr>
+          <a:lstStyle/>
+          <a:p>
+            <a:pPr marL="0" marR="0" lvl="0" indent="0" defTabSz="672263" eaLnBrk="1" fontAlgn="base" latinLnBrk="0" hangingPunct="1">
+              <a:lnSpc>
+                <a:spcPct val="100000"/>
+              </a:lnSpc>
+              <a:spcBef>
+                <a:spcPct val="0"/>
+              </a:spcBef>
+              <a:spcAft>
+                <a:spcPct val="0"/>
+              </a:spcAft>
+              <a:buClrTx/>
+              <a:buSzTx/>
+              <a:buFont typeface="Arial"/>
+              <a:buNone/>
+              <a:tabLst/>
+              <a:defRPr/>
+            </a:pPr>
+            <a:endParaRPr kumimoji="0" lang="en-US" sz="1765" b="0" i="0" u="none" strike="noStrike" kern="0" cap="none" spc="0" normalizeH="0" baseline="0" noProof="0">
+              <a:ln>
+                <a:noFill/>
+              </a:ln>
+              <a:effectLst/>
+              <a:uLnTx/>
+              <a:uFillTx/>
+              <a:latin typeface="Segoe UI"/>
+              <a:cs typeface="Arial"/>
+              <a:sym typeface="Arial"/>
+            </a:endParaRPr>
+          </a:p>
+        </p:txBody>
+      </p:sp>
+      <p:cxnSp>
+        <p:nvCxnSpPr>
+          <p:cNvPr id="13" name="Straight Arrow Connector 12">
+            <a:extLst>
+              <a:ext uri="{FF2B5EF4-FFF2-40B4-BE49-F238E27FC236}">
+                <a16:creationId xmlns:a16="http://schemas.microsoft.com/office/drawing/2014/main" id="{615C85DB-BFC4-4BDB-87AC-0FA6BF613E7B}"/>
+              </a:ext>
+            </a:extLst>
+          </p:cNvPr>
+          <p:cNvCxnSpPr>
+            <a:cxnSpLocks/>
+            <a:endCxn id="5" idx="1"/>
+          </p:cNvCxnSpPr>
+          <p:nvPr/>
+        </p:nvCxnSpPr>
+        <p:spPr>
+          <a:xfrm>
+            <a:off x="2255892" y="3217978"/>
+            <a:ext cx="2051374" cy="0"/>
+          </a:xfrm>
+          <a:prstGeom prst="straightConnector1">
+            <a:avLst/>
+          </a:prstGeom>
+          <a:ln>
+            <a:tailEnd type="triangle"/>
+          </a:ln>
+        </p:spPr>
+        <p:style>
+          <a:lnRef idx="1">
+            <a:schemeClr val="accent1"/>
+          </a:lnRef>
+          <a:fillRef idx="0">
+            <a:schemeClr val="accent1"/>
+          </a:fillRef>
+          <a:effectRef idx="0">
+            <a:schemeClr val="accent1"/>
+          </a:effectRef>
+          <a:fontRef idx="minor">
+            <a:schemeClr val="tx1"/>
+          </a:fontRef>
+        </p:style>
+      </p:cxnSp>
+      <p:cxnSp>
+        <p:nvCxnSpPr>
+          <p:cNvPr id="18" name="Straight Arrow Connector 17">
+            <a:extLst>
+              <a:ext uri="{FF2B5EF4-FFF2-40B4-BE49-F238E27FC236}">
+                <a16:creationId xmlns:a16="http://schemas.microsoft.com/office/drawing/2014/main" id="{1C2FA0E2-BBDF-7634-E289-844A6935D00E}"/>
+              </a:ext>
+            </a:extLst>
+          </p:cNvPr>
+          <p:cNvCxnSpPr>
+            <a:cxnSpLocks/>
+          </p:cNvCxnSpPr>
+          <p:nvPr/>
+        </p:nvCxnSpPr>
+        <p:spPr>
+          <a:xfrm>
+            <a:off x="5387877" y="3222311"/>
+            <a:ext cx="1076170" cy="0"/>
+          </a:xfrm>
+          <a:prstGeom prst="straightConnector1">
+            <a:avLst/>
+          </a:prstGeom>
+          <a:ln>
+            <a:tailEnd type="triangle"/>
+          </a:ln>
+        </p:spPr>
+        <p:style>
+          <a:lnRef idx="1">
+            <a:schemeClr val="accent1"/>
+          </a:lnRef>
+          <a:fillRef idx="0">
+            <a:schemeClr val="accent1"/>
+          </a:fillRef>
+          <a:effectRef idx="0">
+            <a:schemeClr val="accent1"/>
+          </a:effectRef>
+          <a:fontRef idx="minor">
+            <a:schemeClr val="tx1"/>
+          </a:fontRef>
+        </p:style>
+      </p:cxnSp>
+      <p:grpSp>
+        <p:nvGrpSpPr>
+          <p:cNvPr id="4" name="Group 3">
+            <a:extLst>
+              <a:ext uri="{FF2B5EF4-FFF2-40B4-BE49-F238E27FC236}">
+                <a16:creationId xmlns:a16="http://schemas.microsoft.com/office/drawing/2014/main" id="{51416171-F560-1C8A-9B46-7321F5B28FC2}"/>
+              </a:ext>
+            </a:extLst>
+          </p:cNvPr>
+          <p:cNvGrpSpPr/>
+          <p:nvPr/>
+        </p:nvGrpSpPr>
+        <p:grpSpPr>
+          <a:xfrm>
+            <a:off x="8297684" y="2455392"/>
+            <a:ext cx="1259232" cy="1259232"/>
+            <a:chOff x="9536982" y="2467219"/>
+            <a:chExt cx="1259232" cy="1259232"/>
+          </a:xfrm>
+        </p:grpSpPr>
+        <p:pic>
+          <p:nvPicPr>
+            <p:cNvPr id="7" name="図 101">
+              <a:extLst>
+                <a:ext uri="{FF2B5EF4-FFF2-40B4-BE49-F238E27FC236}">
+                  <a16:creationId xmlns:a16="http://schemas.microsoft.com/office/drawing/2014/main" id="{03465EB5-821B-3F59-1CEC-F33691865447}"/>
+                </a:ext>
+              </a:extLst>
+            </p:cNvPr>
+            <p:cNvPicPr>
+              <a:picLocks noChangeAspect="1"/>
+            </p:cNvPicPr>
+            <p:nvPr/>
+          </p:nvPicPr>
+          <p:blipFill>
+            <a:blip r:embed="rId4" cstate="print">
+              <a:extLst>
+                <a:ext uri="{28A0092B-C50C-407E-A947-70E740481C1C}">
+                  <a14:useLocalDpi xmlns:a14="http://schemas.microsoft.com/office/drawing/2010/main" val="0"/>
+                </a:ext>
+              </a:extLst>
+            </a:blip>
+            <a:stretch>
+              <a:fillRect/>
+            </a:stretch>
+          </p:blipFill>
+          <p:spPr>
+            <a:xfrm>
+              <a:off x="9536982" y="2467219"/>
+              <a:ext cx="1259232" cy="1259232"/>
+            </a:xfrm>
+            <a:prstGeom prst="rect">
+              <a:avLst/>
+            </a:prstGeom>
+          </p:spPr>
+        </p:pic>
+        <p:sp>
+          <p:nvSpPr>
+            <p:cNvPr id="22" name="Rectangle 21">
+              <a:extLst>
+                <a:ext uri="{FF2B5EF4-FFF2-40B4-BE49-F238E27FC236}">
+                  <a16:creationId xmlns:a16="http://schemas.microsoft.com/office/drawing/2014/main" id="{8CC01BF7-6CBB-1A11-01D2-D65A02EEA862}"/>
+                </a:ext>
+              </a:extLst>
+            </p:cNvPr>
+            <p:cNvSpPr/>
+            <p:nvPr/>
+          </p:nvSpPr>
+          <p:spPr>
+            <a:xfrm>
+              <a:off x="9651479" y="3384621"/>
+              <a:ext cx="1030238" cy="207749"/>
+            </a:xfrm>
+            <a:prstGeom prst="rect">
+              <a:avLst/>
+            </a:prstGeom>
+            <a:noFill/>
+          </p:spPr>
+          <p:txBody>
+            <a:bodyPr wrap="square" lIns="68580" tIns="34290" rIns="68580" bIns="34290" rtlCol="0">
+              <a:spAutoFit/>
+            </a:bodyPr>
+            <a:lstStyle/>
+            <a:p>
+              <a:pPr marL="0" marR="0" lvl="0" indent="0" algn="ctr" defTabSz="699448" eaLnBrk="1" fontAlgn="auto" latinLnBrk="0" hangingPunct="1">
+                <a:lnSpc>
+                  <a:spcPct val="100000"/>
+                </a:lnSpc>
+                <a:spcBef>
+                  <a:spcPts val="0"/>
+                </a:spcBef>
+                <a:spcAft>
+                  <a:spcPts val="0"/>
+                </a:spcAft>
+                <a:buClrTx/>
+                <a:buSzTx/>
+                <a:buFont typeface="Arial"/>
+                <a:buNone/>
+                <a:tabLst/>
+                <a:defRPr/>
+              </a:pPr>
+              <a:r>
+                <a:rPr kumimoji="0" lang="en-US" sz="900" b="0" i="0" u="none" strike="noStrike" kern="0" cap="none" spc="0" normalizeH="0" baseline="0" noProof="0" dirty="0">
+                  <a:ln>
+                    <a:noFill/>
+                  </a:ln>
+                  <a:effectLst/>
+                  <a:uLnTx/>
+                  <a:uFillTx/>
+                  <a:latin typeface="Segoe UI Semibold"/>
+                  <a:cs typeface="Segoe UI Semibold" panose="020B0702040204020203" pitchFamily="34" charset="0"/>
+                  <a:sym typeface="Arial"/>
+                </a:rPr>
+                <a:t>Power App</a:t>
+              </a:r>
+            </a:p>
+          </p:txBody>
+        </p:sp>
+      </p:grpSp>
+      <p:cxnSp>
+        <p:nvCxnSpPr>
+          <p:cNvPr id="32" name="Straight Arrow Connector 31">
+            <a:extLst>
+              <a:ext uri="{FF2B5EF4-FFF2-40B4-BE49-F238E27FC236}">
+                <a16:creationId xmlns:a16="http://schemas.microsoft.com/office/drawing/2014/main" id="{9CB8689A-FF21-FF08-0F6A-A3E900447C08}"/>
+              </a:ext>
+            </a:extLst>
+          </p:cNvPr>
+          <p:cNvCxnSpPr>
+            <a:cxnSpLocks/>
+          </p:cNvCxnSpPr>
+          <p:nvPr/>
+        </p:nvCxnSpPr>
+        <p:spPr>
+          <a:xfrm flipV="1">
+            <a:off x="7333066" y="2936504"/>
+            <a:ext cx="1079115" cy="4149"/>
+          </a:xfrm>
+          <a:prstGeom prst="straightConnector1">
+            <a:avLst/>
+          </a:prstGeom>
+          <a:ln>
+            <a:tailEnd type="triangle"/>
+          </a:ln>
+        </p:spPr>
+        <p:style>
+          <a:lnRef idx="1">
+            <a:schemeClr val="accent1"/>
+          </a:lnRef>
+          <a:fillRef idx="0">
+            <a:schemeClr val="accent1"/>
+          </a:fillRef>
+          <a:effectRef idx="0">
+            <a:schemeClr val="accent1"/>
+          </a:effectRef>
+          <a:fontRef idx="minor">
+            <a:schemeClr val="tx1"/>
+          </a:fontRef>
+        </p:style>
+      </p:cxnSp>
+      <p:sp>
+        <p:nvSpPr>
+          <p:cNvPr id="36" name="TextBox 35">
+            <a:extLst>
+              <a:ext uri="{FF2B5EF4-FFF2-40B4-BE49-F238E27FC236}">
+                <a16:creationId xmlns:a16="http://schemas.microsoft.com/office/drawing/2014/main" id="{E5A5DADC-16B3-9D52-ED17-16F2385162CF}"/>
+              </a:ext>
+            </a:extLst>
+          </p:cNvPr>
+          <p:cNvSpPr txBox="1"/>
+          <p:nvPr/>
+        </p:nvSpPr>
+        <p:spPr>
+          <a:xfrm>
+            <a:off x="4075334" y="3540343"/>
+            <a:ext cx="1266911" cy="415498"/>
+          </a:xfrm>
+          <a:prstGeom prst="rect">
+            <a:avLst/>
+          </a:prstGeom>
+          <a:noFill/>
+        </p:spPr>
+        <p:txBody>
+          <a:bodyPr wrap="square" rtlCol="0">
+            <a:spAutoFit/>
+          </a:bodyPr>
+          <a:lstStyle/>
+          <a:p>
+            <a:pPr algn="ctr"/>
+            <a:r>
+              <a:rPr lang="en-US" sz="1050" dirty="0"/>
+              <a:t>Full text search (Azure Cog Search) </a:t>
+            </a:r>
+          </a:p>
+        </p:txBody>
+      </p:sp>
+      <p:sp>
+        <p:nvSpPr>
+          <p:cNvPr id="37" name="TextBox 36">
+            <a:extLst>
+              <a:ext uri="{FF2B5EF4-FFF2-40B4-BE49-F238E27FC236}">
+                <a16:creationId xmlns:a16="http://schemas.microsoft.com/office/drawing/2014/main" id="{3F158933-4C2F-221E-7C3D-0882635ADB94}"/>
+              </a:ext>
+            </a:extLst>
+          </p:cNvPr>
+          <p:cNvSpPr txBox="1"/>
+          <p:nvPr/>
+        </p:nvSpPr>
+        <p:spPr>
+          <a:xfrm>
+            <a:off x="2457581" y="2779401"/>
+            <a:ext cx="1266911" cy="415498"/>
+          </a:xfrm>
+          <a:prstGeom prst="rect">
+            <a:avLst/>
+          </a:prstGeom>
+          <a:noFill/>
+        </p:spPr>
+        <p:txBody>
+          <a:bodyPr wrap="square" rtlCol="0">
+            <a:spAutoFit/>
+          </a:bodyPr>
+          <a:lstStyle/>
+          <a:p>
+            <a:pPr algn="ctr"/>
+            <a:r>
+              <a:rPr lang="en-US" sz="1050" dirty="0"/>
+              <a:t>Documents indexing</a:t>
+            </a:r>
+          </a:p>
+        </p:txBody>
+      </p:sp>
+      <p:grpSp>
+        <p:nvGrpSpPr>
+          <p:cNvPr id="20" name="Group 19">
+            <a:extLst>
+              <a:ext uri="{FF2B5EF4-FFF2-40B4-BE49-F238E27FC236}">
+                <a16:creationId xmlns:a16="http://schemas.microsoft.com/office/drawing/2014/main" id="{995E7914-8061-B70B-19A0-C35115A2C9A4}"/>
+              </a:ext>
+            </a:extLst>
+          </p:cNvPr>
+          <p:cNvGrpSpPr/>
+          <p:nvPr/>
+        </p:nvGrpSpPr>
+        <p:grpSpPr>
+          <a:xfrm>
+            <a:off x="6318194" y="4882631"/>
+            <a:ext cx="1266911" cy="1020352"/>
+            <a:chOff x="8014150" y="4516451"/>
+            <a:chExt cx="1266911" cy="1020352"/>
+          </a:xfrm>
+        </p:grpSpPr>
+        <p:pic>
+          <p:nvPicPr>
+            <p:cNvPr id="6" name="Picture 4" descr="openai&quot; Icon - Download for free – Iconduck">
+              <a:extLst>
+                <a:ext uri="{FF2B5EF4-FFF2-40B4-BE49-F238E27FC236}">
+                  <a16:creationId xmlns:a16="http://schemas.microsoft.com/office/drawing/2014/main" id="{F6A2CB20-C78D-3EAC-DE08-16710AA3D379}"/>
+                </a:ext>
+              </a:extLst>
+            </p:cNvPr>
+            <p:cNvPicPr>
+              <a:picLocks noChangeAspect="1" noChangeArrowheads="1"/>
+            </p:cNvPicPr>
+            <p:nvPr/>
+          </p:nvPicPr>
+          <p:blipFill>
+            <a:blip r:embed="rId5">
+              <a:extLst>
+                <a:ext uri="{28A0092B-C50C-407E-A947-70E740481C1C}">
+                  <a14:useLocalDpi xmlns:a14="http://schemas.microsoft.com/office/drawing/2010/main" val="0"/>
+                </a:ext>
+              </a:extLst>
+            </a:blip>
+            <a:srcRect/>
+            <a:stretch>
+              <a:fillRect/>
+            </a:stretch>
+          </p:blipFill>
+          <p:spPr bwMode="auto">
+            <a:xfrm>
+              <a:off x="8346796" y="4516451"/>
+              <a:ext cx="601621" cy="609960"/>
+            </a:xfrm>
+            <a:prstGeom prst="rect">
+              <a:avLst/>
+            </a:prstGeom>
+            <a:noFill/>
+            <a:extLst>
+              <a:ext uri="{909E8E84-426E-40DD-AFC4-6F175D3DCCD1}">
+                <a14:hiddenFill xmlns:a14="http://schemas.microsoft.com/office/drawing/2010/main">
+                  <a:solidFill>
+                    <a:srgbClr val="FFFFFF"/>
+                  </a:solidFill>
+                </a14:hiddenFill>
+              </a:ext>
+            </a:extLst>
+          </p:spPr>
+        </p:pic>
+        <p:sp>
+          <p:nvSpPr>
+            <p:cNvPr id="38" name="TextBox 37">
+              <a:extLst>
+                <a:ext uri="{FF2B5EF4-FFF2-40B4-BE49-F238E27FC236}">
+                  <a16:creationId xmlns:a16="http://schemas.microsoft.com/office/drawing/2014/main" id="{B47AE99B-D873-DDDD-FE26-0445C620B250}"/>
+                </a:ext>
+              </a:extLst>
+            </p:cNvPr>
+            <p:cNvSpPr txBox="1"/>
+            <p:nvPr/>
+          </p:nvSpPr>
+          <p:spPr>
+            <a:xfrm>
+              <a:off x="8014150" y="5121305"/>
+              <a:ext cx="1266911" cy="415498"/>
+            </a:xfrm>
+            <a:prstGeom prst="rect">
+              <a:avLst/>
+            </a:prstGeom>
+            <a:noFill/>
+          </p:spPr>
+          <p:txBody>
+            <a:bodyPr wrap="square" rtlCol="0">
+              <a:spAutoFit/>
+            </a:bodyPr>
+            <a:lstStyle/>
+            <a:p>
+              <a:pPr algn="ctr"/>
+              <a:r>
+                <a:rPr lang="en-US" sz="1050" dirty="0"/>
+                <a:t>Azure </a:t>
+              </a:r>
+              <a:r>
+                <a:rPr lang="en-US" sz="1050" dirty="0" err="1"/>
+                <a:t>OpenAI</a:t>
+              </a:r>
+              <a:r>
+                <a:rPr lang="en-US" sz="1050" dirty="0"/>
+                <a:t> Deployed LLMs</a:t>
+              </a:r>
+            </a:p>
+          </p:txBody>
+        </p:sp>
+      </p:grpSp>
+      <p:cxnSp>
+        <p:nvCxnSpPr>
+          <p:cNvPr id="39" name="Straight Arrow Connector 38">
+            <a:extLst>
+              <a:ext uri="{FF2B5EF4-FFF2-40B4-BE49-F238E27FC236}">
+                <a16:creationId xmlns:a16="http://schemas.microsoft.com/office/drawing/2014/main" id="{38096C9B-66D1-B757-27AB-66DA25D644AB}"/>
+              </a:ext>
+            </a:extLst>
+          </p:cNvPr>
+          <p:cNvCxnSpPr>
+            <a:cxnSpLocks/>
+          </p:cNvCxnSpPr>
+          <p:nvPr/>
+        </p:nvCxnSpPr>
+        <p:spPr>
+          <a:xfrm flipH="1">
+            <a:off x="7333066" y="3127188"/>
+            <a:ext cx="1056889" cy="17092"/>
+          </a:xfrm>
+          <a:prstGeom prst="straightConnector1">
+            <a:avLst/>
+          </a:prstGeom>
+          <a:ln>
+            <a:tailEnd type="triangle"/>
+          </a:ln>
+        </p:spPr>
+        <p:style>
+          <a:lnRef idx="1">
+            <a:schemeClr val="accent1"/>
+          </a:lnRef>
+          <a:fillRef idx="0">
+            <a:schemeClr val="accent1"/>
+          </a:fillRef>
+          <a:effectRef idx="0">
+            <a:schemeClr val="accent1"/>
+          </a:effectRef>
+          <a:fontRef idx="minor">
+            <a:schemeClr val="tx1"/>
+          </a:fontRef>
+        </p:style>
+      </p:cxnSp>
+      <p:grpSp>
+        <p:nvGrpSpPr>
+          <p:cNvPr id="12" name="Group 11">
+            <a:extLst>
+              <a:ext uri="{FF2B5EF4-FFF2-40B4-BE49-F238E27FC236}">
+                <a16:creationId xmlns:a16="http://schemas.microsoft.com/office/drawing/2014/main" id="{58B8D7C9-7278-731F-8EE2-1C302E1DC33E}"/>
+              </a:ext>
+            </a:extLst>
+          </p:cNvPr>
+          <p:cNvGrpSpPr/>
+          <p:nvPr/>
+        </p:nvGrpSpPr>
+        <p:grpSpPr>
+          <a:xfrm>
+            <a:off x="6258004" y="2749610"/>
+            <a:ext cx="1266911" cy="1151306"/>
+            <a:chOff x="7655749" y="3759280"/>
+            <a:chExt cx="1266911" cy="1151306"/>
+          </a:xfrm>
+        </p:grpSpPr>
+        <p:pic>
+          <p:nvPicPr>
+            <p:cNvPr id="16" name="グラフィックス 54">
+              <a:extLst>
+                <a:ext uri="{FF2B5EF4-FFF2-40B4-BE49-F238E27FC236}">
+                  <a16:creationId xmlns:a16="http://schemas.microsoft.com/office/drawing/2014/main" id="{C04F1F3F-2462-2BB2-19F8-6A41E8698195}"/>
+                </a:ext>
+              </a:extLst>
+            </p:cNvPr>
+            <p:cNvPicPr>
+              <a:picLocks noChangeAspect="1"/>
+            </p:cNvPicPr>
+            <p:nvPr/>
+          </p:nvPicPr>
+          <p:blipFill>
+            <a:blip r:embed="rId6">
+              <a:extLst>
+                <a:ext uri="{28A0092B-C50C-407E-A947-70E740481C1C}">
+                  <a14:useLocalDpi xmlns:a14="http://schemas.microsoft.com/office/drawing/2010/main" val="0"/>
+                </a:ext>
+                <a:ext uri="{96DAC541-7B7A-43D3-8B79-37D633B846F1}">
+                  <asvg:svgBlip xmlns:asvg="http://schemas.microsoft.com/office/drawing/2016/SVG/main" r:embed="rId7"/>
+                </a:ext>
+              </a:extLst>
+            </a:blip>
+            <a:stretch>
+              <a:fillRect/>
+            </a:stretch>
+          </p:blipFill>
+          <p:spPr>
+            <a:xfrm>
+              <a:off x="7990511" y="3759280"/>
+              <a:ext cx="597386" cy="597386"/>
+            </a:xfrm>
+            <a:prstGeom prst="rect">
+              <a:avLst/>
+            </a:prstGeom>
+          </p:spPr>
+        </p:pic>
+        <p:sp>
+          <p:nvSpPr>
+            <p:cNvPr id="45" name="TextBox 44">
+              <a:extLst>
+                <a:ext uri="{FF2B5EF4-FFF2-40B4-BE49-F238E27FC236}">
+                  <a16:creationId xmlns:a16="http://schemas.microsoft.com/office/drawing/2014/main" id="{A1E466F7-4D2C-20CC-1D25-E4D06DE0E0D0}"/>
+                </a:ext>
+              </a:extLst>
+            </p:cNvPr>
+            <p:cNvSpPr txBox="1"/>
+            <p:nvPr/>
+          </p:nvSpPr>
+          <p:spPr>
+            <a:xfrm>
+              <a:off x="7655749" y="4333505"/>
+              <a:ext cx="1266911" cy="577081"/>
+            </a:xfrm>
+            <a:prstGeom prst="rect">
+              <a:avLst/>
+            </a:prstGeom>
+            <a:noFill/>
+          </p:spPr>
+          <p:txBody>
+            <a:bodyPr wrap="square" rtlCol="0">
+              <a:spAutoFit/>
+            </a:bodyPr>
+            <a:lstStyle/>
+            <a:p>
+              <a:pPr algn="ctr"/>
+              <a:r>
+                <a:rPr lang="en-US" sz="1050" dirty="0"/>
+                <a:t>Orchestrator</a:t>
+              </a:r>
+            </a:p>
+            <a:p>
+              <a:pPr algn="ctr"/>
+              <a:r>
+                <a:rPr lang="en-US" sz="1050" dirty="0"/>
+                <a:t>(HTTP triggered Azure Function)</a:t>
+              </a:r>
+            </a:p>
+          </p:txBody>
+        </p:sp>
+      </p:grpSp>
+      <p:sp>
+        <p:nvSpPr>
+          <p:cNvPr id="50" name="TextBox 49">
+            <a:extLst>
+              <a:ext uri="{FF2B5EF4-FFF2-40B4-BE49-F238E27FC236}">
+                <a16:creationId xmlns:a16="http://schemas.microsoft.com/office/drawing/2014/main" id="{54555D59-621C-0195-FC1D-F90245234F89}"/>
+              </a:ext>
+            </a:extLst>
+          </p:cNvPr>
+          <p:cNvSpPr txBox="1"/>
+          <p:nvPr/>
+        </p:nvSpPr>
+        <p:spPr>
+          <a:xfrm>
+            <a:off x="7198726" y="3175640"/>
+            <a:ext cx="1266911" cy="253916"/>
+          </a:xfrm>
+          <a:prstGeom prst="rect">
+            <a:avLst/>
+          </a:prstGeom>
+          <a:noFill/>
+        </p:spPr>
+        <p:txBody>
+          <a:bodyPr wrap="square" rtlCol="0">
+            <a:spAutoFit/>
+          </a:bodyPr>
+          <a:lstStyle/>
+          <a:p>
+            <a:pPr algn="ctr"/>
+            <a:r>
+              <a:rPr lang="en-US" sz="1050" dirty="0"/>
+              <a:t>User query</a:t>
+            </a:r>
+          </a:p>
+        </p:txBody>
+      </p:sp>
+      <p:sp>
+        <p:nvSpPr>
+          <p:cNvPr id="54" name="TextBox 53">
+            <a:extLst>
+              <a:ext uri="{FF2B5EF4-FFF2-40B4-BE49-F238E27FC236}">
+                <a16:creationId xmlns:a16="http://schemas.microsoft.com/office/drawing/2014/main" id="{3506B60F-6852-B92D-7895-6CE2814AB810}"/>
+              </a:ext>
+            </a:extLst>
+          </p:cNvPr>
+          <p:cNvSpPr txBox="1"/>
+          <p:nvPr/>
+        </p:nvSpPr>
+        <p:spPr>
+          <a:xfrm>
+            <a:off x="7228054" y="2710329"/>
+            <a:ext cx="1266911" cy="253916"/>
+          </a:xfrm>
+          <a:prstGeom prst="rect">
+            <a:avLst/>
+          </a:prstGeom>
+          <a:noFill/>
+        </p:spPr>
+        <p:txBody>
+          <a:bodyPr wrap="square" rtlCol="0">
+            <a:spAutoFit/>
+          </a:bodyPr>
+          <a:lstStyle/>
+          <a:p>
+            <a:pPr algn="ctr"/>
+            <a:r>
+              <a:rPr lang="en-US" sz="1050" dirty="0"/>
+              <a:t>Answer</a:t>
+            </a:r>
+          </a:p>
+        </p:txBody>
+      </p:sp>
+      <p:sp>
+        <p:nvSpPr>
+          <p:cNvPr id="55" name="TextBox 54">
+            <a:extLst>
+              <a:ext uri="{FF2B5EF4-FFF2-40B4-BE49-F238E27FC236}">
+                <a16:creationId xmlns:a16="http://schemas.microsoft.com/office/drawing/2014/main" id="{DB04D21D-AAB8-A557-030C-907B4984DFF2}"/>
+              </a:ext>
+            </a:extLst>
+          </p:cNvPr>
+          <p:cNvSpPr txBox="1"/>
+          <p:nvPr/>
+        </p:nvSpPr>
+        <p:spPr>
+          <a:xfrm rot="16200000">
+            <a:off x="6010037" y="4249000"/>
+            <a:ext cx="1266911" cy="253916"/>
+          </a:xfrm>
+          <a:prstGeom prst="rect">
+            <a:avLst/>
+          </a:prstGeom>
+          <a:noFill/>
+        </p:spPr>
+        <p:txBody>
+          <a:bodyPr wrap="square" rtlCol="0">
+            <a:spAutoFit/>
+          </a:bodyPr>
+          <a:lstStyle/>
+          <a:p>
+            <a:pPr algn="ctr"/>
+            <a:r>
+              <a:rPr lang="en-US" sz="1050" dirty="0"/>
+              <a:t>Prompt</a:t>
+            </a:r>
+          </a:p>
+        </p:txBody>
+      </p:sp>
+      <p:cxnSp>
+        <p:nvCxnSpPr>
+          <p:cNvPr id="56" name="Straight Arrow Connector 55">
+            <a:extLst>
+              <a:ext uri="{FF2B5EF4-FFF2-40B4-BE49-F238E27FC236}">
+                <a16:creationId xmlns:a16="http://schemas.microsoft.com/office/drawing/2014/main" id="{0C7B4B1F-3B07-D0D4-EE5F-2FAF166F652C}"/>
+              </a:ext>
+            </a:extLst>
+          </p:cNvPr>
+          <p:cNvCxnSpPr>
+            <a:cxnSpLocks/>
+          </p:cNvCxnSpPr>
+          <p:nvPr/>
+        </p:nvCxnSpPr>
+        <p:spPr>
+          <a:xfrm>
+            <a:off x="6776160" y="3869231"/>
+            <a:ext cx="0" cy="992202"/>
+          </a:xfrm>
+          <a:prstGeom prst="straightConnector1">
+            <a:avLst/>
+          </a:prstGeom>
+          <a:ln>
+            <a:tailEnd type="triangle"/>
+          </a:ln>
+        </p:spPr>
+        <p:style>
+          <a:lnRef idx="1">
+            <a:schemeClr val="accent1"/>
+          </a:lnRef>
+          <a:fillRef idx="0">
+            <a:schemeClr val="accent1"/>
+          </a:fillRef>
+          <a:effectRef idx="0">
+            <a:schemeClr val="accent1"/>
+          </a:effectRef>
+          <a:fontRef idx="minor">
+            <a:schemeClr val="tx1"/>
+          </a:fontRef>
+        </p:style>
+      </p:cxnSp>
+      <p:sp>
+        <p:nvSpPr>
+          <p:cNvPr id="59" name="TextBox 58">
+            <a:extLst>
+              <a:ext uri="{FF2B5EF4-FFF2-40B4-BE49-F238E27FC236}">
+                <a16:creationId xmlns:a16="http://schemas.microsoft.com/office/drawing/2014/main" id="{C53A9330-10CB-0132-A8F9-82FB4E9A22A8}"/>
+              </a:ext>
+            </a:extLst>
+          </p:cNvPr>
+          <p:cNvSpPr txBox="1"/>
+          <p:nvPr/>
+        </p:nvSpPr>
+        <p:spPr>
+          <a:xfrm rot="16200000">
+            <a:off x="6719401" y="4249002"/>
+            <a:ext cx="1096686" cy="253916"/>
+          </a:xfrm>
+          <a:prstGeom prst="rect">
+            <a:avLst/>
+          </a:prstGeom>
+          <a:noFill/>
+        </p:spPr>
+        <p:txBody>
+          <a:bodyPr wrap="square" rtlCol="0">
+            <a:spAutoFit/>
+          </a:bodyPr>
+          <a:lstStyle/>
+          <a:p>
+            <a:pPr algn="ctr"/>
+            <a:r>
+              <a:rPr lang="en-US" sz="1050" dirty="0"/>
+              <a:t>Refined result</a:t>
+            </a:r>
+          </a:p>
+        </p:txBody>
+      </p:sp>
+      <p:sp>
+        <p:nvSpPr>
+          <p:cNvPr id="60" name="TextBox 59">
+            <a:extLst>
+              <a:ext uri="{FF2B5EF4-FFF2-40B4-BE49-F238E27FC236}">
+                <a16:creationId xmlns:a16="http://schemas.microsoft.com/office/drawing/2014/main" id="{3A8404F9-B891-D8FD-9034-8401DEE1CAD7}"/>
+              </a:ext>
+            </a:extLst>
+          </p:cNvPr>
+          <p:cNvSpPr txBox="1"/>
+          <p:nvPr/>
+        </p:nvSpPr>
+        <p:spPr>
+          <a:xfrm rot="16200000">
+            <a:off x="5810287" y="4288449"/>
+            <a:ext cx="1266911" cy="253916"/>
+          </a:xfrm>
+          <a:prstGeom prst="rect">
+            <a:avLst/>
+          </a:prstGeom>
+          <a:noFill/>
+        </p:spPr>
+        <p:txBody>
+          <a:bodyPr wrap="square" rtlCol="0">
+            <a:spAutoFit/>
+          </a:bodyPr>
+          <a:lstStyle/>
+          <a:p>
+            <a:pPr algn="ctr"/>
+            <a:r>
+              <a:rPr lang="en-US" sz="1050" dirty="0"/>
+              <a:t>Completion</a:t>
+            </a:r>
+          </a:p>
+        </p:txBody>
+      </p:sp>
+      <p:cxnSp>
+        <p:nvCxnSpPr>
+          <p:cNvPr id="69" name="Straight Arrow Connector 68">
+            <a:extLst>
+              <a:ext uri="{FF2B5EF4-FFF2-40B4-BE49-F238E27FC236}">
+                <a16:creationId xmlns:a16="http://schemas.microsoft.com/office/drawing/2014/main" id="{54F1B120-0D38-6FBF-F924-A0AD44AAA141}"/>
+              </a:ext>
+            </a:extLst>
+          </p:cNvPr>
+          <p:cNvCxnSpPr>
+            <a:cxnSpLocks/>
+          </p:cNvCxnSpPr>
+          <p:nvPr/>
+        </p:nvCxnSpPr>
+        <p:spPr>
+          <a:xfrm flipH="1" flipV="1">
+            <a:off x="5224051" y="3013415"/>
+            <a:ext cx="993795" cy="10644"/>
+          </a:xfrm>
+          <a:prstGeom prst="straightConnector1">
+            <a:avLst/>
+          </a:prstGeom>
+          <a:ln>
+            <a:tailEnd type="triangle"/>
+          </a:ln>
+        </p:spPr>
+        <p:style>
+          <a:lnRef idx="1">
+            <a:schemeClr val="accent1"/>
+          </a:lnRef>
+          <a:fillRef idx="0">
+            <a:schemeClr val="accent1"/>
+          </a:fillRef>
+          <a:effectRef idx="0">
+            <a:schemeClr val="accent1"/>
+          </a:effectRef>
+          <a:fontRef idx="minor">
+            <a:schemeClr val="tx1"/>
+          </a:fontRef>
+        </p:style>
+      </p:cxnSp>
+      <p:sp>
+        <p:nvSpPr>
+          <p:cNvPr id="71" name="TextBox 70">
+            <a:extLst>
+              <a:ext uri="{FF2B5EF4-FFF2-40B4-BE49-F238E27FC236}">
+                <a16:creationId xmlns:a16="http://schemas.microsoft.com/office/drawing/2014/main" id="{024FED4E-82D1-5E84-0934-17D842E14A2A}"/>
+              </a:ext>
+            </a:extLst>
+          </p:cNvPr>
+          <p:cNvSpPr txBox="1"/>
+          <p:nvPr/>
+        </p:nvSpPr>
+        <p:spPr>
+          <a:xfrm>
+            <a:off x="5077206" y="2719382"/>
+            <a:ext cx="1266911" cy="253916"/>
+          </a:xfrm>
+          <a:prstGeom prst="rect">
+            <a:avLst/>
+          </a:prstGeom>
+          <a:noFill/>
+        </p:spPr>
+        <p:txBody>
+          <a:bodyPr wrap="square" rtlCol="0">
+            <a:spAutoFit/>
+          </a:bodyPr>
+          <a:lstStyle/>
+          <a:p>
+            <a:pPr algn="ctr"/>
+            <a:r>
+              <a:rPr lang="en-US" sz="1050" dirty="0"/>
+              <a:t>Search query</a:t>
+            </a:r>
+          </a:p>
+        </p:txBody>
+      </p:sp>
+      <p:sp>
+        <p:nvSpPr>
+          <p:cNvPr id="72" name="TextBox 71">
+            <a:extLst>
+              <a:ext uri="{FF2B5EF4-FFF2-40B4-BE49-F238E27FC236}">
+                <a16:creationId xmlns:a16="http://schemas.microsoft.com/office/drawing/2014/main" id="{4FA7CFE5-D39F-E84B-716D-2C3496D805AA}"/>
+              </a:ext>
+            </a:extLst>
+          </p:cNvPr>
+          <p:cNvSpPr txBox="1"/>
+          <p:nvPr/>
+        </p:nvSpPr>
+        <p:spPr>
+          <a:xfrm>
+            <a:off x="5092639" y="3334628"/>
+            <a:ext cx="1266911" cy="253916"/>
+          </a:xfrm>
+          <a:prstGeom prst="rect">
+            <a:avLst/>
+          </a:prstGeom>
+          <a:noFill/>
+        </p:spPr>
+        <p:txBody>
+          <a:bodyPr wrap="square" rtlCol="0">
+            <a:spAutoFit/>
+          </a:bodyPr>
+          <a:lstStyle/>
+          <a:p>
+            <a:pPr algn="ctr"/>
+            <a:r>
+              <a:rPr lang="en-US" sz="1050" dirty="0"/>
+              <a:t>Raw search result</a:t>
+            </a:r>
+          </a:p>
+        </p:txBody>
+      </p:sp>
+      <p:cxnSp>
+        <p:nvCxnSpPr>
+          <p:cNvPr id="25" name="Straight Arrow Connector 24">
+            <a:extLst>
+              <a:ext uri="{FF2B5EF4-FFF2-40B4-BE49-F238E27FC236}">
+                <a16:creationId xmlns:a16="http://schemas.microsoft.com/office/drawing/2014/main" id="{82070D3D-4020-8C30-98C3-7E1E4F80C5BD}"/>
+              </a:ext>
+            </a:extLst>
+          </p:cNvPr>
+          <p:cNvCxnSpPr>
+            <a:cxnSpLocks/>
+          </p:cNvCxnSpPr>
+          <p:nvPr/>
+        </p:nvCxnSpPr>
+        <p:spPr>
+          <a:xfrm flipV="1">
+            <a:off x="7060644" y="3954381"/>
+            <a:ext cx="0" cy="821902"/>
+          </a:xfrm>
+          <a:prstGeom prst="straightConnector1">
+            <a:avLst/>
+          </a:prstGeom>
+          <a:ln>
+            <a:tailEnd type="triangle"/>
+          </a:ln>
+        </p:spPr>
+        <p:style>
+          <a:lnRef idx="1">
+            <a:schemeClr val="accent1"/>
+          </a:lnRef>
+          <a:fillRef idx="0">
+            <a:schemeClr val="accent1"/>
+          </a:fillRef>
+          <a:effectRef idx="0">
+            <a:schemeClr val="accent1"/>
+          </a:effectRef>
+          <a:fontRef idx="minor">
+            <a:schemeClr val="tx1"/>
+          </a:fontRef>
+        </p:style>
+      </p:cxnSp>
+    </p:spTree>
+    <p:extLst>
+      <p:ext uri="{BB962C8B-B14F-4D97-AF65-F5344CB8AC3E}">
+        <p14:creationId xmlns:p14="http://schemas.microsoft.com/office/powerpoint/2010/main" val="1344751076"/>
+      </p:ext>
+    </p:extLst>
+  </p:cSld>
+  <p:clrMapOvr>
+    <a:masterClrMapping/>
+  </p:clrMapOvr>
+</p:sld>
+</file>
+
 <file path=ppt/theme/theme1.xml><?xml version="1.0" encoding="utf-8"?>
 <a:theme xmlns:a="http://schemas.openxmlformats.org/drawingml/2006/main" name="Office Theme">
   <a:themeElements>

</xml_diff>